<commit_message>
Update slide with a add data with bean
</commit_message>
<xml_diff>
--- a/slide/APACHE_SOLR_4.4_INTRODUCTION.pptx
+++ b/slide/APACHE_SOLR_4.4_INTRODUCTION.pptx
@@ -19,8 +19,9 @@
     <p:sldId id="267" r:id="rId13"/>
     <p:sldId id="271" r:id="rId14"/>
     <p:sldId id="268" r:id="rId15"/>
-    <p:sldId id="269" r:id="rId16"/>
-    <p:sldId id="270" r:id="rId17"/>
+    <p:sldId id="272" r:id="rId16"/>
+    <p:sldId id="269" r:id="rId17"/>
+    <p:sldId id="270" r:id="rId18"/>
   </p:sldIdLst>
   <p:sldSz cx="9144000" cy="6858000" type="screen4x3"/>
   <p:notesSz cx="6858000" cy="9144000"/>
@@ -304,7 +305,7 @@
             <a:fld id="{1D8BD707-D9CF-40AE-B4C6-C98DA3205C09}" type="datetimeFigureOut">
               <a:rPr lang="en-US" smtClean="0"/>
               <a:pPr/>
-              <a:t>7/27/2013</a:t>
+              <a:t>7/28/2013</a:t>
             </a:fld>
             <a:endParaRPr lang="en-US"/>
           </a:p>
@@ -471,7 +472,7 @@
             <a:fld id="{1D8BD707-D9CF-40AE-B4C6-C98DA3205C09}" type="datetimeFigureOut">
               <a:rPr lang="en-US" smtClean="0"/>
               <a:pPr/>
-              <a:t>7/27/2013</a:t>
+              <a:t>7/28/2013</a:t>
             </a:fld>
             <a:endParaRPr lang="en-US"/>
           </a:p>
@@ -648,7 +649,7 @@
             <a:fld id="{1D8BD707-D9CF-40AE-B4C6-C98DA3205C09}" type="datetimeFigureOut">
               <a:rPr lang="en-US" smtClean="0"/>
               <a:pPr/>
-              <a:t>7/27/2013</a:t>
+              <a:t>7/28/2013</a:t>
             </a:fld>
             <a:endParaRPr lang="en-US"/>
           </a:p>
@@ -815,7 +816,7 @@
             <a:fld id="{1D8BD707-D9CF-40AE-B4C6-C98DA3205C09}" type="datetimeFigureOut">
               <a:rPr lang="en-US" smtClean="0"/>
               <a:pPr/>
-              <a:t>7/27/2013</a:t>
+              <a:t>7/28/2013</a:t>
             </a:fld>
             <a:endParaRPr lang="en-US"/>
           </a:p>
@@ -1058,7 +1059,7 @@
             <a:fld id="{1D8BD707-D9CF-40AE-B4C6-C98DA3205C09}" type="datetimeFigureOut">
               <a:rPr lang="en-US" smtClean="0"/>
               <a:pPr/>
-              <a:t>7/27/2013</a:t>
+              <a:t>7/28/2013</a:t>
             </a:fld>
             <a:endParaRPr lang="en-US"/>
           </a:p>
@@ -1343,7 +1344,7 @@
             <a:fld id="{1D8BD707-D9CF-40AE-B4C6-C98DA3205C09}" type="datetimeFigureOut">
               <a:rPr lang="en-US" smtClean="0"/>
               <a:pPr/>
-              <a:t>7/27/2013</a:t>
+              <a:t>7/28/2013</a:t>
             </a:fld>
             <a:endParaRPr lang="en-US"/>
           </a:p>
@@ -1762,7 +1763,7 @@
             <a:fld id="{1D8BD707-D9CF-40AE-B4C6-C98DA3205C09}" type="datetimeFigureOut">
               <a:rPr lang="en-US" smtClean="0"/>
               <a:pPr/>
-              <a:t>7/27/2013</a:t>
+              <a:t>7/28/2013</a:t>
             </a:fld>
             <a:endParaRPr lang="en-US"/>
           </a:p>
@@ -1877,7 +1878,7 @@
             <a:fld id="{1D8BD707-D9CF-40AE-B4C6-C98DA3205C09}" type="datetimeFigureOut">
               <a:rPr lang="en-US" smtClean="0"/>
               <a:pPr/>
-              <a:t>7/27/2013</a:t>
+              <a:t>7/28/2013</a:t>
             </a:fld>
             <a:endParaRPr lang="en-US"/>
           </a:p>
@@ -1969,7 +1970,7 @@
             <a:fld id="{1D8BD707-D9CF-40AE-B4C6-C98DA3205C09}" type="datetimeFigureOut">
               <a:rPr lang="en-US" smtClean="0"/>
               <a:pPr/>
-              <a:t>7/27/2013</a:t>
+              <a:t>7/28/2013</a:t>
             </a:fld>
             <a:endParaRPr lang="en-US"/>
           </a:p>
@@ -2243,7 +2244,7 @@
             <a:fld id="{1D8BD707-D9CF-40AE-B4C6-C98DA3205C09}" type="datetimeFigureOut">
               <a:rPr lang="en-US" smtClean="0"/>
               <a:pPr/>
-              <a:t>7/27/2013</a:t>
+              <a:t>7/28/2013</a:t>
             </a:fld>
             <a:endParaRPr lang="en-US"/>
           </a:p>
@@ -2493,7 +2494,7 @@
             <a:fld id="{1D8BD707-D9CF-40AE-B4C6-C98DA3205C09}" type="datetimeFigureOut">
               <a:rPr lang="en-US" smtClean="0"/>
               <a:pPr/>
-              <a:t>7/27/2013</a:t>
+              <a:t>7/28/2013</a:t>
             </a:fld>
             <a:endParaRPr lang="en-US"/>
           </a:p>
@@ -2703,7 +2704,7 @@
             <a:fld id="{1D8BD707-D9CF-40AE-B4C6-C98DA3205C09}" type="datetimeFigureOut">
               <a:rPr lang="en-US" smtClean="0"/>
               <a:pPr/>
-              <a:t>7/27/2013</a:t>
+              <a:t>7/28/2013</a:t>
             </a:fld>
             <a:endParaRPr lang="en-US"/>
           </a:p>
@@ -3381,19 +3382,7 @@
               <a:rPr lang="en-US" dirty="0" smtClean="0">
                 <a:hlinkClick r:id="rId2"/>
               </a:rPr>
-              <a:t>http</a:t>
-            </a:r>
-            <a:r>
-              <a:rPr lang="en-US" dirty="0" smtClean="0">
-                <a:hlinkClick r:id="rId2"/>
-              </a:rPr>
-              <a:t>://</a:t>
-            </a:r>
-            <a:r>
-              <a:rPr lang="en-US" dirty="0" smtClean="0">
-                <a:hlinkClick r:id="rId2"/>
-              </a:rPr>
-              <a:t>wiki.apache.org/solr/IntegratingSolr</a:t>
+              <a:t>http://wiki.apache.org/solr/IntegratingSolr</a:t>
             </a:r>
             <a:endParaRPr lang="en-US" dirty="0" smtClean="0"/>
           </a:p>
@@ -3412,13 +3401,7 @@
               <a:rPr lang="en-US" dirty="0" smtClean="0">
                 <a:hlinkClick r:id="rId3"/>
               </a:rPr>
-              <a:t>http://</a:t>
-            </a:r>
-            <a:r>
-              <a:rPr lang="en-US" dirty="0" smtClean="0">
-                <a:hlinkClick r:id="rId3"/>
-              </a:rPr>
-              <a:t>wiki.apache.org/solr/Solrj</a:t>
+              <a:t>http://wiki.apache.org/solr/Solrj</a:t>
             </a:r>
             <a:endParaRPr lang="en-US" dirty="0" smtClean="0"/>
           </a:p>
@@ -3508,15 +3491,7 @@
             </a:r>
             <a:r>
               <a:rPr lang="en-US" sz="2800" dirty="0" smtClean="0"/>
-              <a:t> clone https</a:t>
-            </a:r>
-            <a:r>
-              <a:rPr lang="en-US" sz="2800" dirty="0" smtClean="0"/>
-              <a:t>://</a:t>
-            </a:r>
-            <a:r>
-              <a:rPr lang="en-US" sz="2800" dirty="0" smtClean="0"/>
-              <a:t>github.com/up1/solr_4_demo.git</a:t>
+              <a:t> clone https://github.com/up1/solr_4_demo.git</a:t>
             </a:r>
             <a:endParaRPr lang="en-US" sz="2800" dirty="0"/>
           </a:p>
@@ -3680,13 +3655,8 @@
             </a:pPr>
             <a:r>
               <a:rPr lang="en-US" dirty="0" smtClean="0"/>
-              <a:t>doc1.addField("price", 10</a:t>
-            </a:r>
-            <a:r>
-              <a:rPr lang="en-US" dirty="0" smtClean="0"/>
-              <a:t>);</a:t>
-            </a:r>
-            <a:endParaRPr lang="en-US" dirty="0" smtClean="0"/>
+              <a:t>doc1.addField("price", 10);</a:t>
+            </a:r>
           </a:p>
           <a:p>
             <a:pPr>
@@ -3872,7 +3842,11 @@
           <a:p>
             <a:r>
               <a:rPr lang="en-US" dirty="0" smtClean="0"/>
-              <a:t>Delete Data</a:t>
+              <a:t>Indexing </a:t>
+            </a:r>
+            <a:r>
+              <a:rPr lang="en-US" dirty="0" smtClean="0"/>
+              <a:t>Data with Bean</a:t>
             </a:r>
             <a:endParaRPr lang="en-US" dirty="0"/>
           </a:p>
@@ -3891,7 +3865,7 @@
         <p:spPr/>
         <p:txBody>
           <a:bodyPr>
-            <a:normAutofit/>
+            <a:normAutofit fontScale="77500" lnSpcReduction="20000"/>
           </a:bodyPr>
           <a:lstStyle/>
           <a:p>
@@ -3899,15 +3873,15 @@
               <a:buNone/>
             </a:pPr>
             <a:r>
-              <a:rPr lang="en-US" sz="2800" dirty="0" smtClean="0"/>
+              <a:rPr lang="en-US" dirty="0" smtClean="0"/>
               <a:t>String </a:t>
             </a:r>
             <a:r>
-              <a:rPr lang="en-US" sz="2800" dirty="0" err="1" smtClean="0"/>
+              <a:rPr lang="en-US" dirty="0" err="1" smtClean="0"/>
               <a:t>url</a:t>
             </a:r>
             <a:r>
-              <a:rPr lang="en-US" sz="2800" dirty="0" smtClean="0"/>
+              <a:rPr lang="en-US" dirty="0" smtClean="0"/>
               <a:t> = "http://localhost:8080/app1/collection1";</a:t>
             </a:r>
           </a:p>
@@ -3916,41 +3890,40 @@
               <a:buNone/>
             </a:pPr>
             <a:r>
-              <a:rPr lang="en-US" sz="2800" dirty="0" err="1" smtClean="0"/>
+              <a:rPr lang="en-US" dirty="0" err="1" smtClean="0"/>
               <a:t>SolrServer</a:t>
             </a:r>
             <a:r>
-              <a:rPr lang="en-US" sz="2800" dirty="0" smtClean="0"/>
+              <a:rPr lang="en-US" dirty="0" smtClean="0"/>
               <a:t> server = new </a:t>
             </a:r>
             <a:r>
-              <a:rPr lang="en-US" sz="2800" dirty="0" err="1" smtClean="0"/>
+              <a:rPr lang="en-US" dirty="0" err="1" smtClean="0"/>
               <a:t>HttpSolrServer</a:t>
             </a:r>
             <a:r>
-              <a:rPr lang="en-US" sz="2800" dirty="0" smtClean="0"/>
+              <a:rPr lang="en-US" dirty="0" smtClean="0"/>
               <a:t>(</a:t>
             </a:r>
             <a:r>
-              <a:rPr lang="en-US" sz="2800" dirty="0" err="1" smtClean="0"/>
+              <a:rPr lang="en-US" dirty="0" err="1" smtClean="0"/>
               <a:t>url</a:t>
             </a:r>
             <a:r>
-              <a:rPr lang="en-US" sz="2800" dirty="0" smtClean="0"/>
+              <a:rPr lang="en-US" dirty="0" smtClean="0"/>
               <a:t>);</a:t>
             </a:r>
           </a:p>
           <a:p>
+            <a:endParaRPr lang="en-US" dirty="0" smtClean="0"/>
+          </a:p>
+          <a:p>
             <a:pPr>
               <a:buNone/>
             </a:pPr>
             <a:r>
-              <a:rPr lang="en-US" sz="2800" dirty="0" err="1" smtClean="0"/>
-              <a:t>server.deleteByQuery</a:t>
-            </a:r>
-            <a:r>
-              <a:rPr lang="en-US" sz="2800" dirty="0" smtClean="0"/>
-              <a:t>("*:*");</a:t>
+              <a:rPr lang="en-US" dirty="0" smtClean="0"/>
+              <a:t>Product product1 = new Product("1", "product 1", 100f);</a:t>
             </a:r>
           </a:p>
           <a:p>
@@ -3958,14 +3931,89 @@
               <a:buNone/>
             </a:pPr>
             <a:r>
-              <a:rPr lang="en-US" sz="2800" dirty="0" err="1" smtClean="0"/>
+              <a:rPr lang="en-US" dirty="0" smtClean="0"/>
+              <a:t>Product product2 = new Product("2", "product 2", 200f);</a:t>
+            </a:r>
+          </a:p>
+          <a:p>
+            <a:pPr>
+              <a:buNone/>
+            </a:pPr>
+            <a:r>
+              <a:rPr lang="en-US" dirty="0" smtClean="0"/>
+              <a:t>List&lt;Product&gt; products = new </a:t>
+            </a:r>
+            <a:r>
+              <a:rPr lang="en-US" dirty="0" err="1" smtClean="0"/>
+              <a:t>ArrayList</a:t>
+            </a:r>
+            <a:r>
+              <a:rPr lang="en-US" dirty="0" smtClean="0"/>
+              <a:t>&lt;Product&gt;();</a:t>
+            </a:r>
+          </a:p>
+          <a:p>
+            <a:pPr>
+              <a:buNone/>
+            </a:pPr>
+            <a:r>
+              <a:rPr lang="en-US" dirty="0" err="1" smtClean="0"/>
+              <a:t>products.add</a:t>
+            </a:r>
+            <a:r>
+              <a:rPr lang="en-US" dirty="0" smtClean="0"/>
+              <a:t>(product1);</a:t>
+            </a:r>
+          </a:p>
+          <a:p>
+            <a:pPr>
+              <a:buNone/>
+            </a:pPr>
+            <a:r>
+              <a:rPr lang="en-US" dirty="0" err="1" smtClean="0"/>
+              <a:t>products.add</a:t>
+            </a:r>
+            <a:r>
+              <a:rPr lang="en-US" dirty="0" smtClean="0"/>
+              <a:t>(product2</a:t>
+            </a:r>
+            <a:r>
+              <a:rPr lang="en-US" dirty="0" smtClean="0"/>
+              <a:t>);</a:t>
+            </a:r>
+          </a:p>
+          <a:p>
+            <a:pPr>
+              <a:buNone/>
+            </a:pPr>
+            <a:endParaRPr lang="en-US" dirty="0" smtClean="0"/>
+          </a:p>
+          <a:p>
+            <a:pPr>
+              <a:buNone/>
+            </a:pPr>
+            <a:r>
+              <a:rPr lang="en-US" dirty="0" err="1" smtClean="0"/>
+              <a:t>server.addBeans</a:t>
+            </a:r>
+            <a:r>
+              <a:rPr lang="en-US" dirty="0" smtClean="0"/>
+              <a:t>(products);</a:t>
+            </a:r>
+          </a:p>
+          <a:p>
+            <a:pPr>
+              <a:buNone/>
+            </a:pPr>
+            <a:r>
+              <a:rPr lang="en-US" dirty="0" err="1" smtClean="0"/>
               <a:t>server.commit</a:t>
             </a:r>
             <a:r>
-              <a:rPr lang="en-US" sz="2800" dirty="0" smtClean="0"/>
+              <a:rPr lang="en-US" dirty="0" smtClean="0"/>
               <a:t>();</a:t>
             </a:r>
-            <a:endParaRPr lang="en-US" sz="2800" dirty="0" smtClean="0"/>
+            <a:endParaRPr lang="en-US" dirty="0"/>
           </a:p>
         </p:txBody>
       </p:sp>
@@ -3978,6 +4026,144 @@
 </file>
 
 <file path=ppt/slides/slide16.xml><?xml version="1.0" encoding="utf-8"?>
+<p:sld xmlns:a="http://schemas.openxmlformats.org/drawingml/2006/main" xmlns:r="http://schemas.openxmlformats.org/officeDocument/2006/relationships" xmlns:p="http://schemas.openxmlformats.org/presentationml/2006/main">
+  <p:cSld>
+    <p:spTree>
+      <p:nvGrpSpPr>
+        <p:cNvPr id="1" name=""/>
+        <p:cNvGrpSpPr/>
+        <p:nvPr/>
+      </p:nvGrpSpPr>
+      <p:grpSpPr>
+        <a:xfrm>
+          <a:off x="0" y="0"/>
+          <a:ext cx="0" cy="0"/>
+          <a:chOff x="0" y="0"/>
+          <a:chExt cx="0" cy="0"/>
+        </a:xfrm>
+      </p:grpSpPr>
+      <p:sp>
+        <p:nvSpPr>
+          <p:cNvPr id="2" name="Title 1"/>
+          <p:cNvSpPr>
+            <a:spLocks noGrp="1"/>
+          </p:cNvSpPr>
+          <p:nvPr>
+            <p:ph type="title"/>
+          </p:nvPr>
+        </p:nvSpPr>
+        <p:spPr/>
+        <p:txBody>
+          <a:bodyPr/>
+          <a:lstStyle/>
+          <a:p>
+            <a:r>
+              <a:rPr lang="en-US" dirty="0" smtClean="0"/>
+              <a:t>Delete Data</a:t>
+            </a:r>
+            <a:endParaRPr lang="en-US" dirty="0"/>
+          </a:p>
+        </p:txBody>
+      </p:sp>
+      <p:sp>
+        <p:nvSpPr>
+          <p:cNvPr id="3" name="Content Placeholder 2"/>
+          <p:cNvSpPr>
+            <a:spLocks noGrp="1"/>
+          </p:cNvSpPr>
+          <p:nvPr>
+            <p:ph idx="1"/>
+          </p:nvPr>
+        </p:nvSpPr>
+        <p:spPr/>
+        <p:txBody>
+          <a:bodyPr>
+            <a:normAutofit/>
+          </a:bodyPr>
+          <a:lstStyle/>
+          <a:p>
+            <a:pPr>
+              <a:buNone/>
+            </a:pPr>
+            <a:r>
+              <a:rPr lang="en-US" sz="2800" dirty="0" smtClean="0"/>
+              <a:t>String </a:t>
+            </a:r>
+            <a:r>
+              <a:rPr lang="en-US" sz="2800" dirty="0" err="1" smtClean="0"/>
+              <a:t>url</a:t>
+            </a:r>
+            <a:r>
+              <a:rPr lang="en-US" sz="2800" dirty="0" smtClean="0"/>
+              <a:t> = "http://localhost:8080/app1/collection1";</a:t>
+            </a:r>
+          </a:p>
+          <a:p>
+            <a:pPr>
+              <a:buNone/>
+            </a:pPr>
+            <a:r>
+              <a:rPr lang="en-US" sz="2800" dirty="0" err="1" smtClean="0"/>
+              <a:t>SolrServer</a:t>
+            </a:r>
+            <a:r>
+              <a:rPr lang="en-US" sz="2800" dirty="0" smtClean="0"/>
+              <a:t> server = new </a:t>
+            </a:r>
+            <a:r>
+              <a:rPr lang="en-US" sz="2800" dirty="0" err="1" smtClean="0"/>
+              <a:t>HttpSolrServer</a:t>
+            </a:r>
+            <a:r>
+              <a:rPr lang="en-US" sz="2800" dirty="0" smtClean="0"/>
+              <a:t>(</a:t>
+            </a:r>
+            <a:r>
+              <a:rPr lang="en-US" sz="2800" dirty="0" err="1" smtClean="0"/>
+              <a:t>url</a:t>
+            </a:r>
+            <a:r>
+              <a:rPr lang="en-US" sz="2800" dirty="0" smtClean="0"/>
+              <a:t>);</a:t>
+            </a:r>
+          </a:p>
+          <a:p>
+            <a:pPr>
+              <a:buNone/>
+            </a:pPr>
+            <a:r>
+              <a:rPr lang="en-US" sz="2800" dirty="0" err="1" smtClean="0"/>
+              <a:t>server.deleteByQuery</a:t>
+            </a:r>
+            <a:r>
+              <a:rPr lang="en-US" sz="2800" dirty="0" smtClean="0"/>
+              <a:t>("*:*");</a:t>
+            </a:r>
+          </a:p>
+          <a:p>
+            <a:pPr>
+              <a:buNone/>
+            </a:pPr>
+            <a:r>
+              <a:rPr lang="en-US" sz="2800" dirty="0" err="1" smtClean="0"/>
+              <a:t>server.commit</a:t>
+            </a:r>
+            <a:r>
+              <a:rPr lang="en-US" sz="2800" dirty="0" smtClean="0"/>
+              <a:t>();</a:t>
+            </a:r>
+          </a:p>
+        </p:txBody>
+      </p:sp>
+    </p:spTree>
+  </p:cSld>
+  <p:clrMapOvr>
+    <a:masterClrMapping/>
+  </p:clrMapOvr>
+</p:sld>
+</file>
+
+<file path=ppt/slides/slide17.xml><?xml version="1.0" encoding="utf-8"?>
 <p:sld xmlns:a="http://schemas.openxmlformats.org/drawingml/2006/main" xmlns:r="http://schemas.openxmlformats.org/officeDocument/2006/relationships" xmlns:p="http://schemas.openxmlformats.org/presentationml/2006/main">
   <p:cSld>
     <p:spTree>
@@ -4668,15 +4854,7 @@
           <a:p>
             <a:r>
               <a:rPr lang="en-US" sz="2800" dirty="0" smtClean="0"/>
-              <a:t>In %CATALINA_HOME</a:t>
-            </a:r>
-            <a:r>
-              <a:rPr lang="en-US" sz="2800" dirty="0" smtClean="0"/>
-              <a:t>%\</a:t>
-            </a:r>
-            <a:r>
-              <a:rPr lang="en-US" sz="2800" dirty="0" smtClean="0"/>
-              <a:t>conf\Catalina\</a:t>
+              <a:t>In %CATALINA_HOME%\conf\Catalina\</a:t>
             </a:r>
             <a:r>
               <a:rPr lang="en-US" sz="2800" dirty="0" err="1" smtClean="0"/>
@@ -4712,11 +4890,7 @@
             </a:r>
             <a:r>
               <a:rPr lang="en-US" sz="2400" b="1" dirty="0" smtClean="0"/>
-              <a:t>c</a:t>
-            </a:r>
-            <a:r>
-              <a:rPr lang="en-US" sz="2400" b="1" dirty="0" smtClean="0"/>
-              <a:t>:\\solr-4.4.0 \\example\\</a:t>
+              <a:t>c:\\solr-4.4.0 \\example\\</a:t>
             </a:r>
             <a:r>
               <a:rPr lang="en-US" sz="2400" b="1" dirty="0" err="1" smtClean="0"/>
@@ -4740,11 +4914,7 @@
             </a:r>
             <a:r>
               <a:rPr lang="en-US" sz="2400" dirty="0" smtClean="0"/>
-              <a:t>="true" </a:t>
-            </a:r>
-            <a:r>
-              <a:rPr lang="en-US" sz="2400" dirty="0" smtClean="0"/>
-              <a:t>&gt;</a:t>
+              <a:t>="true" &gt;</a:t>
             </a:r>
           </a:p>
           <a:p>
@@ -4780,19 +4950,11 @@
             </a:r>
             <a:r>
               <a:rPr lang="en-US" sz="2400" b="1" dirty="0" smtClean="0"/>
-              <a:t>c</a:t>
-            </a:r>
-            <a:r>
-              <a:rPr lang="en-US" sz="2400" b="1" dirty="0" smtClean="0"/>
-              <a:t>:\\app11</a:t>
+              <a:t>c:\\app11</a:t>
             </a:r>
             <a:r>
               <a:rPr lang="en-US" sz="2400" dirty="0" smtClean="0"/>
-              <a:t>" override="true" </a:t>
-            </a:r>
-            <a:r>
-              <a:rPr lang="en-US" sz="2400" dirty="0" smtClean="0"/>
-              <a:t>/&gt;</a:t>
+              <a:t>" override="true" /&gt;</a:t>
             </a:r>
           </a:p>
           <a:p>
@@ -5068,13 +5230,7 @@
               <a:rPr lang="en-US" sz="2800" dirty="0" smtClean="0">
                 <a:hlinkClick r:id="rId2"/>
               </a:rPr>
-              <a:t>http://</a:t>
-            </a:r>
-            <a:r>
-              <a:rPr lang="en-US" sz="2800" dirty="0" smtClean="0">
-                <a:hlinkClick r:id="rId2"/>
-              </a:rPr>
-              <a:t>www.slf4j.org</a:t>
+              <a:t>http://www.slf4j.org</a:t>
             </a:r>
             <a:endParaRPr lang="en-US" sz="2800" dirty="0" smtClean="0"/>
           </a:p>

</xml_diff>

<commit_message>
Upate feature of solr
</commit_message>
<xml_diff>
--- a/slide/APACHE_SOLR_4.4_INTRODUCTION.pptx
+++ b/slide/APACHE_SOLR_4.4_INTRODUCTION.pptx
@@ -3842,11 +3842,7 @@
           <a:p>
             <a:r>
               <a:rPr lang="en-US" dirty="0" smtClean="0"/>
-              <a:t>Indexing </a:t>
-            </a:r>
-            <a:r>
-              <a:rPr lang="en-US" dirty="0" smtClean="0"/>
-              <a:t>Data with Bean</a:t>
+              <a:t>Indexing Data with Bean</a:t>
             </a:r>
             <a:endParaRPr lang="en-US" dirty="0"/>
           </a:p>
@@ -3975,11 +3971,7 @@
             </a:r>
             <a:r>
               <a:rPr lang="en-US" dirty="0" smtClean="0"/>
-              <a:t>(product2</a:t>
-            </a:r>
-            <a:r>
-              <a:rPr lang="en-US" dirty="0" smtClean="0"/>
-              <a:t>);</a:t>
+              <a:t>(product2);</a:t>
             </a:r>
           </a:p>
           <a:p>
@@ -4564,10 +4556,62 @@
         </p:nvSpPr>
         <p:spPr/>
         <p:txBody>
-          <a:bodyPr/>
-          <a:lstStyle/>
-          <a:p>
-            <a:endParaRPr lang="en-US"/>
+          <a:bodyPr>
+            <a:normAutofit lnSpcReduction="10000"/>
+          </a:bodyPr>
+          <a:lstStyle/>
+          <a:p>
+            <a:r>
+              <a:rPr lang="en-US" dirty="0" smtClean="0"/>
+              <a:t>Full Text Search</a:t>
+            </a:r>
+          </a:p>
+          <a:p>
+            <a:r>
+              <a:rPr lang="en-US" dirty="0" smtClean="0"/>
+              <a:t>Optimize for high volume web traffic</a:t>
+            </a:r>
+          </a:p>
+          <a:p>
+            <a:r>
+              <a:rPr lang="en-US" dirty="0" smtClean="0"/>
+              <a:t>Support XML, JSON</a:t>
+            </a:r>
+          </a:p>
+          <a:p>
+            <a:r>
+              <a:rPr lang="en-US" dirty="0" smtClean="0"/>
+              <a:t>Near Real time indexing</a:t>
+            </a:r>
+          </a:p>
+          <a:p>
+            <a:r>
+              <a:rPr lang="en-US" dirty="0" smtClean="0"/>
+              <a:t>Admin interface</a:t>
+            </a:r>
+          </a:p>
+          <a:p>
+            <a:r>
+              <a:rPr lang="en-US" dirty="0" smtClean="0"/>
+              <a:t>Support JMX</a:t>
+            </a:r>
+          </a:p>
+          <a:p>
+            <a:r>
+              <a:rPr lang="en-US" dirty="0" smtClean="0"/>
+              <a:t>XML configuration</a:t>
+            </a:r>
+          </a:p>
+          <a:p>
+            <a:r>
+              <a:rPr lang="en-US" dirty="0" smtClean="0"/>
+              <a:t>Extensible with </a:t>
+            </a:r>
+            <a:r>
+              <a:rPr lang="en-US" dirty="0" err="1" smtClean="0"/>
+              <a:t>plugin</a:t>
+            </a:r>
+            <a:endParaRPr lang="en-US" dirty="0"/>
           </a:p>
         </p:txBody>
       </p:sp>

</xml_diff>